<commit_message>
Fixed the presentation a little bit
</commit_message>
<xml_diff>
--- a/Презентация данных.pptx
+++ b/Презентация данных.pptx
@@ -7,9 +7,11 @@
   <p:sldIdLst>
     <p:sldId id="256" r:id="rId2"/>
     <p:sldId id="257" r:id="rId3"/>
-    <p:sldId id="258" r:id="rId4"/>
-    <p:sldId id="259" r:id="rId5"/>
-    <p:sldId id="260" r:id="rId6"/>
+    <p:sldId id="262" r:id="rId4"/>
+    <p:sldId id="258" r:id="rId5"/>
+    <p:sldId id="259" r:id="rId6"/>
+    <p:sldId id="260" r:id="rId7"/>
+    <p:sldId id="261" r:id="rId8"/>
   </p:sldIdLst>
   <p:sldSz cx="12192000" cy="6858000"/>
   <p:notesSz cx="6858000" cy="9144000"/>
@@ -108,6 +110,11 @@
       </a:defRPr>
     </a:lvl9pPr>
   </p:defaultTextStyle>
+  <p:extLst>
+    <p:ext uri="{EFAFB233-063F-42B5-8137-9DF3F51BA10A}">
+      <p15:sldGuideLst xmlns:p15="http://schemas.microsoft.com/office/powerpoint/2012/main"/>
+    </p:ext>
+  </p:extLst>
 </p:presentation>
 </file>
 
@@ -20817,6 +20824,186 @@
           <p:cNvPr id="2" name="Заголовок 1">
             <a:extLst>
               <a:ext uri="{FF2B5EF4-FFF2-40B4-BE49-F238E27FC236}">
+                <a16:creationId xmlns:a16="http://schemas.microsoft.com/office/drawing/2014/main" id="{058E15F6-9DCD-4E8A-B8ED-432DF1082423}"/>
+              </a:ext>
+            </a:extLst>
+          </p:cNvPr>
+          <p:cNvSpPr>
+            <a:spLocks noGrp="1"/>
+          </p:cNvSpPr>
+          <p:nvPr>
+            <p:ph type="title"/>
+          </p:nvPr>
+        </p:nvSpPr>
+        <p:spPr/>
+        <p:txBody>
+          <a:bodyPr/>
+          <a:lstStyle/>
+          <a:p>
+            <a:r>
+              <a:rPr lang="ru-RU" dirty="0" err="1"/>
+              <a:t>Датасет</a:t>
+            </a:r>
+            <a:r>
+              <a:rPr lang="ru-RU" dirty="0"/>
+              <a:t> из базы данных</a:t>
+            </a:r>
+          </a:p>
+        </p:txBody>
+      </p:sp>
+      <p:sp>
+        <p:nvSpPr>
+          <p:cNvPr id="3" name="Объект 2">
+            <a:extLst>
+              <a:ext uri="{FF2B5EF4-FFF2-40B4-BE49-F238E27FC236}">
+                <a16:creationId xmlns:a16="http://schemas.microsoft.com/office/drawing/2014/main" id="{CCE4F612-5F98-4142-B7E0-78AD406F1817}"/>
+              </a:ext>
+            </a:extLst>
+          </p:cNvPr>
+          <p:cNvSpPr>
+            <a:spLocks noGrp="1"/>
+          </p:cNvSpPr>
+          <p:nvPr>
+            <p:ph idx="1"/>
+          </p:nvPr>
+        </p:nvSpPr>
+        <p:spPr/>
+        <p:txBody>
+          <a:bodyPr>
+            <a:normAutofit fontScale="92500"/>
+          </a:bodyPr>
+          <a:lstStyle/>
+          <a:p>
+            <a:pPr marL="0" indent="0">
+              <a:buNone/>
+            </a:pPr>
+            <a:r>
+              <a:rPr lang="ru-RU" dirty="0"/>
+              <a:t>Из базы данных я выгрузил признаки, наиболее важные для построения модели</a:t>
+            </a:r>
+            <a:r>
+              <a:rPr lang="en-US" dirty="0"/>
+              <a:t>: </a:t>
+            </a:r>
+          </a:p>
+          <a:p>
+            <a:pPr>
+              <a:buFont typeface="Arial" panose="020B0604020202020204" pitchFamily="34" charset="0"/>
+              <a:buChar char="•"/>
+            </a:pPr>
+            <a:r>
+              <a:rPr lang="ru-RU" dirty="0"/>
+              <a:t> Идентификационный номер рейса</a:t>
+            </a:r>
+          </a:p>
+          <a:p>
+            <a:pPr>
+              <a:buFont typeface="Arial" panose="020B0604020202020204" pitchFamily="34" charset="0"/>
+              <a:buChar char="•"/>
+            </a:pPr>
+            <a:r>
+              <a:rPr lang="ru-RU" dirty="0"/>
+              <a:t> Выручка</a:t>
+            </a:r>
+          </a:p>
+          <a:p>
+            <a:pPr>
+              <a:buFont typeface="Arial" panose="020B0604020202020204" pitchFamily="34" charset="0"/>
+              <a:buChar char="•"/>
+            </a:pPr>
+            <a:r>
+              <a:rPr lang="ru-RU" dirty="0"/>
+              <a:t> Время в полете</a:t>
+            </a:r>
+          </a:p>
+          <a:p>
+            <a:pPr>
+              <a:buFont typeface="Arial" panose="020B0604020202020204" pitchFamily="34" charset="0"/>
+              <a:buChar char="•"/>
+            </a:pPr>
+            <a:r>
+              <a:rPr lang="ru-RU" dirty="0"/>
+              <a:t> Аэропорты вылета</a:t>
+            </a:r>
+            <a:r>
+              <a:rPr lang="en-US" dirty="0"/>
+              <a:t>/</a:t>
+            </a:r>
+            <a:r>
+              <a:rPr lang="ru-RU" dirty="0"/>
+              <a:t>прилета</a:t>
+            </a:r>
+          </a:p>
+          <a:p>
+            <a:pPr>
+              <a:buFont typeface="Arial" panose="020B0604020202020204" pitchFamily="34" charset="0"/>
+              <a:buChar char="•"/>
+            </a:pPr>
+            <a:r>
+              <a:rPr lang="ru-RU" dirty="0"/>
+              <a:t> Число пассажиров</a:t>
+            </a:r>
+          </a:p>
+          <a:p>
+            <a:pPr marL="0" indent="0">
+              <a:buNone/>
+            </a:pPr>
+            <a:r>
+              <a:rPr lang="ru-RU" dirty="0"/>
+              <a:t>Позднее были вычислены затраты на перелет и доходность</a:t>
+            </a:r>
+          </a:p>
+          <a:p>
+            <a:pPr marL="0" indent="0">
+              <a:buNone/>
+            </a:pPr>
+            <a:r>
+              <a:rPr lang="ru-RU" dirty="0"/>
+              <a:t>Наибольшее влияние на доходность имеет количество пассажиров, а на расходы- время </a:t>
+            </a:r>
+            <a:r>
+              <a:rPr lang="ru-RU"/>
+              <a:t>в воздухе</a:t>
+            </a:r>
+            <a:endParaRPr lang="ru-RU" dirty="0"/>
+          </a:p>
+        </p:txBody>
+      </p:sp>
+    </p:spTree>
+    <p:extLst>
+      <p:ext uri="{BB962C8B-B14F-4D97-AF65-F5344CB8AC3E}">
+        <p14:creationId xmlns:p14="http://schemas.microsoft.com/office/powerpoint/2010/main" val="2136069554"/>
+      </p:ext>
+    </p:extLst>
+  </p:cSld>
+  <p:clrMapOvr>
+    <a:masterClrMapping/>
+  </p:clrMapOvr>
+</p:sld>
+</file>
+
+<file path=ppt/slides/slide4.xml><?xml version="1.0" encoding="utf-8"?>
+<p:sld xmlns:a="http://schemas.openxmlformats.org/drawingml/2006/main" xmlns:r="http://schemas.openxmlformats.org/officeDocument/2006/relationships" xmlns:p="http://schemas.openxmlformats.org/presentationml/2006/main">
+  <p:cSld>
+    <p:spTree>
+      <p:nvGrpSpPr>
+        <p:cNvPr id="1" name=""/>
+        <p:cNvGrpSpPr/>
+        <p:nvPr/>
+      </p:nvGrpSpPr>
+      <p:grpSpPr>
+        <a:xfrm>
+          <a:off x="0" y="0"/>
+          <a:ext cx="0" cy="0"/>
+          <a:chOff x="0" y="0"/>
+          <a:chExt cx="0" cy="0"/>
+        </a:xfrm>
+      </p:grpSpPr>
+      <p:sp>
+        <p:nvSpPr>
+          <p:cNvPr id="2" name="Заголовок 1">
+            <a:extLst>
+              <a:ext uri="{FF2B5EF4-FFF2-40B4-BE49-F238E27FC236}">
                 <a16:creationId xmlns:a16="http://schemas.microsoft.com/office/drawing/2014/main" id="{9E7A969E-8BC2-4178-8D5D-56A63851A51B}"/>
               </a:ext>
             </a:extLst>
@@ -20904,7 +21091,7 @@
 </p:sld>
 </file>
 
-<file path=ppt/slides/slide4.xml><?xml version="1.0" encoding="utf-8"?>
+<file path=ppt/slides/slide5.xml><?xml version="1.0" encoding="utf-8"?>
 <p:sld xmlns:a="http://schemas.openxmlformats.org/drawingml/2006/main" xmlns:r="http://schemas.openxmlformats.org/officeDocument/2006/relationships" xmlns:p="http://schemas.openxmlformats.org/presentationml/2006/main">
   <p:cSld>
     <p:spTree>
@@ -21059,7 +21246,7 @@
 </p:sld>
 </file>
 
-<file path=ppt/slides/slide5.xml><?xml version="1.0" encoding="utf-8"?>
+<file path=ppt/slides/slide6.xml><?xml version="1.0" encoding="utf-8"?>
 <p:sld xmlns:a="http://schemas.openxmlformats.org/drawingml/2006/main" xmlns:r="http://schemas.openxmlformats.org/officeDocument/2006/relationships" xmlns:p="http://schemas.openxmlformats.org/presentationml/2006/main">
   <p:cSld>
     <p:spTree>
@@ -21287,6 +21474,149 @@
     <p:extLst>
       <p:ext uri="{BB962C8B-B14F-4D97-AF65-F5344CB8AC3E}">
         <p14:creationId xmlns:p14="http://schemas.microsoft.com/office/powerpoint/2010/main" val="1045533090"/>
+      </p:ext>
+    </p:extLst>
+  </p:cSld>
+  <p:clrMapOvr>
+    <a:masterClrMapping/>
+  </p:clrMapOvr>
+</p:sld>
+</file>
+
+<file path=ppt/slides/slide7.xml><?xml version="1.0" encoding="utf-8"?>
+<p:sld xmlns:a="http://schemas.openxmlformats.org/drawingml/2006/main" xmlns:r="http://schemas.openxmlformats.org/officeDocument/2006/relationships" xmlns:p="http://schemas.openxmlformats.org/presentationml/2006/main">
+  <p:cSld>
+    <p:spTree>
+      <p:nvGrpSpPr>
+        <p:cNvPr id="1" name=""/>
+        <p:cNvGrpSpPr/>
+        <p:nvPr/>
+      </p:nvGrpSpPr>
+      <p:grpSpPr>
+        <a:xfrm>
+          <a:off x="0" y="0"/>
+          <a:ext cx="0" cy="0"/>
+          <a:chOff x="0" y="0"/>
+          <a:chExt cx="0" cy="0"/>
+        </a:xfrm>
+      </p:grpSpPr>
+      <p:sp>
+        <p:nvSpPr>
+          <p:cNvPr id="5" name="Заголовок 4">
+            <a:extLst>
+              <a:ext uri="{FF2B5EF4-FFF2-40B4-BE49-F238E27FC236}">
+                <a16:creationId xmlns:a16="http://schemas.microsoft.com/office/drawing/2014/main" id="{B1C29251-E4DB-414E-84B3-3D05C54DED7D}"/>
+              </a:ext>
+            </a:extLst>
+          </p:cNvPr>
+          <p:cNvSpPr>
+            <a:spLocks noGrp="1"/>
+          </p:cNvSpPr>
+          <p:nvPr>
+            <p:ph type="title"/>
+          </p:nvPr>
+        </p:nvSpPr>
+        <p:spPr/>
+        <p:txBody>
+          <a:bodyPr/>
+          <a:lstStyle/>
+          <a:p>
+            <a:r>
+              <a:rPr lang="ru-RU" dirty="0"/>
+              <a:t>Предложения по улучшению базы</a:t>
+            </a:r>
+          </a:p>
+        </p:txBody>
+      </p:sp>
+      <p:sp>
+        <p:nvSpPr>
+          <p:cNvPr id="6" name="Объект 5">
+            <a:extLst>
+              <a:ext uri="{FF2B5EF4-FFF2-40B4-BE49-F238E27FC236}">
+                <a16:creationId xmlns:a16="http://schemas.microsoft.com/office/drawing/2014/main" id="{8724606F-AB10-41A0-999C-88AB8CF2E123}"/>
+              </a:ext>
+            </a:extLst>
+          </p:cNvPr>
+          <p:cNvSpPr>
+            <a:spLocks noGrp="1"/>
+          </p:cNvSpPr>
+          <p:nvPr>
+            <p:ph idx="1"/>
+          </p:nvPr>
+        </p:nvSpPr>
+        <p:spPr/>
+        <p:txBody>
+          <a:bodyPr/>
+          <a:lstStyle/>
+          <a:p>
+            <a:r>
+              <a:rPr lang="ru-RU" dirty="0"/>
+              <a:t>Возможно, последующий анализ бы улучшился, если в базу были добавлены</a:t>
+            </a:r>
+            <a:r>
+              <a:rPr lang="en-US" dirty="0"/>
+              <a:t>:</a:t>
+            </a:r>
+          </a:p>
+          <a:p>
+            <a:pPr>
+              <a:buFont typeface="Arial" panose="020B0604020202020204" pitchFamily="34" charset="0"/>
+              <a:buChar char="•"/>
+            </a:pPr>
+            <a:r>
+              <a:rPr lang="ru-RU" dirty="0"/>
+              <a:t> Цель перелета (Грузовой</a:t>
+            </a:r>
+            <a:r>
+              <a:rPr lang="en-US" dirty="0"/>
+              <a:t>/</a:t>
+            </a:r>
+            <a:r>
+              <a:rPr lang="ru-RU" dirty="0"/>
+              <a:t>Пассажирский</a:t>
+            </a:r>
+            <a:r>
+              <a:rPr lang="en-US" dirty="0"/>
+              <a:t>/</a:t>
+            </a:r>
+            <a:r>
+              <a:rPr lang="ru-RU" dirty="0"/>
+              <a:t>Перегон)</a:t>
+            </a:r>
+          </a:p>
+          <a:p>
+            <a:pPr>
+              <a:buFont typeface="Arial" panose="020B0604020202020204" pitchFamily="34" charset="0"/>
+              <a:buChar char="•"/>
+            </a:pPr>
+            <a:r>
+              <a:rPr lang="ru-RU" dirty="0"/>
+              <a:t> Возможность онлайн – бронирования</a:t>
+            </a:r>
+          </a:p>
+          <a:p>
+            <a:pPr>
+              <a:buFont typeface="Arial" panose="020B0604020202020204" pitchFamily="34" charset="0"/>
+              <a:buChar char="•"/>
+            </a:pPr>
+            <a:r>
+              <a:rPr lang="ru-RU" dirty="0"/>
+              <a:t> Стоимость топлива на момент перелета</a:t>
+            </a:r>
+          </a:p>
+          <a:p>
+            <a:pPr>
+              <a:buFont typeface="Arial" panose="020B0604020202020204" pitchFamily="34" charset="0"/>
+              <a:buChar char="•"/>
+            </a:pPr>
+            <a:endParaRPr lang="ru-RU" dirty="0"/>
+          </a:p>
+        </p:txBody>
+      </p:sp>
+    </p:spTree>
+    <p:extLst>
+      <p:ext uri="{BB962C8B-B14F-4D97-AF65-F5344CB8AC3E}">
+        <p14:creationId xmlns:p14="http://schemas.microsoft.com/office/powerpoint/2010/main" val="4165380929"/>
       </p:ext>
     </p:extLst>
   </p:cSld>

</xml_diff>